<commit_message>
# added images in english # added parameters section to both docs (SPA ENG)
</commit_message>
<xml_diff>
--- a/Content/Images/standAloneTerminal/standAloneTerminalImages.pptx
+++ b/Content/Images/standAloneTerminal/standAloneTerminalImages.pptx
@@ -11,6 +11,22 @@
     <p:sldId id="258" r:id="rId5"/>
     <p:sldId id="259" r:id="rId6"/>
     <p:sldId id="260" r:id="rId7"/>
+    <p:sldId id="262" r:id="rId8"/>
+    <p:sldId id="263" r:id="rId9"/>
+    <p:sldId id="264" r:id="rId10"/>
+    <p:sldId id="265" r:id="rId11"/>
+    <p:sldId id="266" r:id="rId12"/>
+    <p:sldId id="267" r:id="rId13"/>
+    <p:sldId id="268" r:id="rId14"/>
+    <p:sldId id="269" r:id="rId15"/>
+    <p:sldId id="270" r:id="rId16"/>
+    <p:sldId id="274" r:id="rId17"/>
+    <p:sldId id="271" r:id="rId18"/>
+    <p:sldId id="272" r:id="rId19"/>
+    <p:sldId id="273" r:id="rId20"/>
+    <p:sldId id="275" r:id="rId21"/>
+    <p:sldId id="276" r:id="rId22"/>
+    <p:sldId id="277" r:id="rId23"/>
   </p:sldIdLst>
   <p:sldSz cx="12192000" cy="6858000"/>
   <p:notesSz cx="6858000" cy="9144000"/>
@@ -3115,6 +3131,1648 @@
 </p:sld>
 </file>
 
+<file path=ppt/slides/slide10.xml><?xml version="1.0" encoding="utf-8"?>
+<p:sld xmlns:a="http://schemas.openxmlformats.org/drawingml/2006/main" xmlns:r="http://schemas.openxmlformats.org/officeDocument/2006/relationships" xmlns:p="http://schemas.openxmlformats.org/presentationml/2006/main">
+  <p:cSld>
+    <p:spTree>
+      <p:nvGrpSpPr>
+        <p:cNvPr id="1" name=""/>
+        <p:cNvGrpSpPr/>
+        <p:nvPr/>
+      </p:nvGrpSpPr>
+      <p:grpSpPr>
+        <a:xfrm>
+          <a:off x="0" y="0"/>
+          <a:ext cx="0" cy="0"/>
+          <a:chOff x="0" y="0"/>
+          <a:chExt cx="0" cy="0"/>
+        </a:xfrm>
+      </p:grpSpPr>
+      <p:pic>
+        <p:nvPicPr>
+          <p:cNvPr id="4" name="Picture 3"/>
+          <p:cNvPicPr>
+            <a:picLocks noChangeAspect="1"/>
+          </p:cNvPicPr>
+          <p:nvPr/>
+        </p:nvPicPr>
+        <p:blipFill>
+          <a:blip r:embed="rId2">
+            <a:extLst>
+              <a:ext uri="{28A0092B-C50C-407E-A947-70E740481C1C}">
+                <a14:useLocalDpi xmlns:a14="http://schemas.microsoft.com/office/drawing/2010/main" val="0"/>
+              </a:ext>
+            </a:extLst>
+          </a:blip>
+          <a:stretch>
+            <a:fillRect/>
+          </a:stretch>
+        </p:blipFill>
+        <p:spPr>
+          <a:xfrm>
+            <a:off x="2844059" y="990044"/>
+            <a:ext cx="6503882" cy="4877911"/>
+          </a:xfrm>
+          <a:prstGeom prst="rect">
+            <a:avLst/>
+          </a:prstGeom>
+        </p:spPr>
+      </p:pic>
+      <p:sp>
+        <p:nvSpPr>
+          <p:cNvPr id="5" name="Rectangle 4"/>
+          <p:cNvSpPr/>
+          <p:nvPr/>
+        </p:nvSpPr>
+        <p:spPr>
+          <a:xfrm>
+            <a:off x="4366437" y="2445488"/>
+            <a:ext cx="2863703" cy="574159"/>
+          </a:xfrm>
+          <a:prstGeom prst="rect">
+            <a:avLst/>
+          </a:prstGeom>
+          <a:solidFill>
+            <a:schemeClr val="bg1"/>
+          </a:solidFill>
+          <a:ln>
+            <a:noFill/>
+          </a:ln>
+        </p:spPr>
+        <p:style>
+          <a:lnRef idx="2">
+            <a:schemeClr val="accent1">
+              <a:shade val="50000"/>
+            </a:schemeClr>
+          </a:lnRef>
+          <a:fillRef idx="1">
+            <a:schemeClr val="accent1"/>
+          </a:fillRef>
+          <a:effectRef idx="0">
+            <a:schemeClr val="accent1"/>
+          </a:effectRef>
+          <a:fontRef idx="minor">
+            <a:schemeClr val="lt1"/>
+          </a:fontRef>
+        </p:style>
+        <p:txBody>
+          <a:bodyPr rtlCol="0" anchor="ctr"/>
+          <a:lstStyle/>
+          <a:p>
+            <a:pPr algn="ctr"/>
+            <a:endParaRPr lang="es-AR"/>
+          </a:p>
+        </p:txBody>
+      </p:sp>
+      <p:sp>
+        <p:nvSpPr>
+          <p:cNvPr id="6" name="TextBox 5"/>
+          <p:cNvSpPr txBox="1"/>
+          <p:nvPr/>
+        </p:nvSpPr>
+        <p:spPr>
+          <a:xfrm>
+            <a:off x="4366437" y="2505669"/>
+            <a:ext cx="2842437" cy="923330"/>
+          </a:xfrm>
+          <a:prstGeom prst="rect">
+            <a:avLst/>
+          </a:prstGeom>
+          <a:noFill/>
+        </p:spPr>
+        <p:txBody>
+          <a:bodyPr wrap="square" rtlCol="0">
+            <a:spAutoFit/>
+          </a:bodyPr>
+          <a:lstStyle/>
+          <a:p>
+            <a:r>
+              <a:rPr lang="es-AR" dirty="0" smtClean="0"/>
+              <a:t>INPUT CAN’T BE GREATER THAN THE AUTHORIZATION QUANTITY</a:t>
+            </a:r>
+            <a:endParaRPr lang="es-AR" dirty="0"/>
+          </a:p>
+        </p:txBody>
+      </p:sp>
+    </p:spTree>
+    <p:extLst>
+      <p:ext uri="{BB962C8B-B14F-4D97-AF65-F5344CB8AC3E}">
+        <p14:creationId xmlns:p14="http://schemas.microsoft.com/office/powerpoint/2010/main" val="994108054"/>
+      </p:ext>
+    </p:extLst>
+  </p:cSld>
+  <p:clrMapOvr>
+    <a:masterClrMapping/>
+  </p:clrMapOvr>
+</p:sld>
+</file>
+
+<file path=ppt/slides/slide11.xml><?xml version="1.0" encoding="utf-8"?>
+<p:sld xmlns:a="http://schemas.openxmlformats.org/drawingml/2006/main" xmlns:r="http://schemas.openxmlformats.org/officeDocument/2006/relationships" xmlns:p="http://schemas.openxmlformats.org/presentationml/2006/main">
+  <p:cSld>
+    <p:spTree>
+      <p:nvGrpSpPr>
+        <p:cNvPr id="1" name=""/>
+        <p:cNvGrpSpPr/>
+        <p:nvPr/>
+      </p:nvGrpSpPr>
+      <p:grpSpPr>
+        <a:xfrm>
+          <a:off x="0" y="0"/>
+          <a:ext cx="0" cy="0"/>
+          <a:chOff x="0" y="0"/>
+          <a:chExt cx="0" cy="0"/>
+        </a:xfrm>
+      </p:grpSpPr>
+      <p:pic>
+        <p:nvPicPr>
+          <p:cNvPr id="4" name="Picture 3"/>
+          <p:cNvPicPr>
+            <a:picLocks noChangeAspect="1"/>
+          </p:cNvPicPr>
+          <p:nvPr/>
+        </p:nvPicPr>
+        <p:blipFill>
+          <a:blip r:embed="rId2">
+            <a:extLst>
+              <a:ext uri="{28A0092B-C50C-407E-A947-70E740481C1C}">
+                <a14:useLocalDpi xmlns:a14="http://schemas.microsoft.com/office/drawing/2010/main" val="0"/>
+              </a:ext>
+            </a:extLst>
+          </a:blip>
+          <a:stretch>
+            <a:fillRect/>
+          </a:stretch>
+        </p:blipFill>
+        <p:spPr>
+          <a:xfrm>
+            <a:off x="2844059" y="990044"/>
+            <a:ext cx="6503882" cy="4877911"/>
+          </a:xfrm>
+          <a:prstGeom prst="rect">
+            <a:avLst/>
+          </a:prstGeom>
+        </p:spPr>
+      </p:pic>
+      <p:sp>
+        <p:nvSpPr>
+          <p:cNvPr id="5" name="Rectangle 4"/>
+          <p:cNvSpPr/>
+          <p:nvPr/>
+        </p:nvSpPr>
+        <p:spPr>
+          <a:xfrm>
+            <a:off x="4430233" y="2565991"/>
+            <a:ext cx="2934586" cy="432390"/>
+          </a:xfrm>
+          <a:prstGeom prst="rect">
+            <a:avLst/>
+          </a:prstGeom>
+          <a:solidFill>
+            <a:schemeClr val="bg1"/>
+          </a:solidFill>
+          <a:ln>
+            <a:noFill/>
+          </a:ln>
+        </p:spPr>
+        <p:style>
+          <a:lnRef idx="2">
+            <a:schemeClr val="accent1">
+              <a:shade val="50000"/>
+            </a:schemeClr>
+          </a:lnRef>
+          <a:fillRef idx="1">
+            <a:schemeClr val="accent1"/>
+          </a:fillRef>
+          <a:effectRef idx="0">
+            <a:schemeClr val="accent1"/>
+          </a:effectRef>
+          <a:fontRef idx="minor">
+            <a:schemeClr val="lt1"/>
+          </a:fontRef>
+        </p:style>
+        <p:txBody>
+          <a:bodyPr rtlCol="0" anchor="ctr"/>
+          <a:lstStyle/>
+          <a:p>
+            <a:pPr algn="ctr"/>
+            <a:endParaRPr lang="es-AR"/>
+          </a:p>
+        </p:txBody>
+      </p:sp>
+      <p:sp>
+        <p:nvSpPr>
+          <p:cNvPr id="6" name="TextBox 5"/>
+          <p:cNvSpPr txBox="1"/>
+          <p:nvPr/>
+        </p:nvSpPr>
+        <p:spPr>
+          <a:xfrm>
+            <a:off x="4430233" y="3076353"/>
+            <a:ext cx="2757376" cy="369332"/>
+          </a:xfrm>
+          <a:prstGeom prst="rect">
+            <a:avLst/>
+          </a:prstGeom>
+          <a:noFill/>
+        </p:spPr>
+        <p:txBody>
+          <a:bodyPr wrap="square" rtlCol="0">
+            <a:spAutoFit/>
+          </a:bodyPr>
+          <a:lstStyle/>
+          <a:p>
+            <a:r>
+              <a:rPr lang="es-AR" dirty="0" smtClean="0"/>
+              <a:t>OPERATION COMPLETED</a:t>
+            </a:r>
+            <a:endParaRPr lang="es-AR" dirty="0"/>
+          </a:p>
+        </p:txBody>
+      </p:sp>
+    </p:spTree>
+    <p:extLst>
+      <p:ext uri="{BB962C8B-B14F-4D97-AF65-F5344CB8AC3E}">
+        <p14:creationId xmlns:p14="http://schemas.microsoft.com/office/powerpoint/2010/main" val="691092476"/>
+      </p:ext>
+    </p:extLst>
+  </p:cSld>
+  <p:clrMapOvr>
+    <a:masterClrMapping/>
+  </p:clrMapOvr>
+</p:sld>
+</file>
+
+<file path=ppt/slides/slide12.xml><?xml version="1.0" encoding="utf-8"?>
+<p:sld xmlns:a="http://schemas.openxmlformats.org/drawingml/2006/main" xmlns:r="http://schemas.openxmlformats.org/officeDocument/2006/relationships" xmlns:p="http://schemas.openxmlformats.org/presentationml/2006/main">
+  <p:cSld>
+    <p:spTree>
+      <p:nvGrpSpPr>
+        <p:cNvPr id="1" name=""/>
+        <p:cNvGrpSpPr/>
+        <p:nvPr/>
+      </p:nvGrpSpPr>
+      <p:grpSpPr>
+        <a:xfrm>
+          <a:off x="0" y="0"/>
+          <a:ext cx="0" cy="0"/>
+          <a:chOff x="0" y="0"/>
+          <a:chExt cx="0" cy="0"/>
+        </a:xfrm>
+      </p:grpSpPr>
+      <p:pic>
+        <p:nvPicPr>
+          <p:cNvPr id="4" name="Picture 3"/>
+          <p:cNvPicPr>
+            <a:picLocks noChangeAspect="1"/>
+          </p:cNvPicPr>
+          <p:nvPr/>
+        </p:nvPicPr>
+        <p:blipFill>
+          <a:blip r:embed="rId2">
+            <a:extLst>
+              <a:ext uri="{28A0092B-C50C-407E-A947-70E740481C1C}">
+                <a14:useLocalDpi xmlns:a14="http://schemas.microsoft.com/office/drawing/2010/main" val="0"/>
+              </a:ext>
+            </a:extLst>
+          </a:blip>
+          <a:stretch>
+            <a:fillRect/>
+          </a:stretch>
+        </p:blipFill>
+        <p:spPr>
+          <a:xfrm>
+            <a:off x="2844059" y="990044"/>
+            <a:ext cx="6503882" cy="4877911"/>
+          </a:xfrm>
+          <a:prstGeom prst="rect">
+            <a:avLst/>
+          </a:prstGeom>
+        </p:spPr>
+      </p:pic>
+      <p:sp>
+        <p:nvSpPr>
+          <p:cNvPr id="5" name="Rectangle 4"/>
+          <p:cNvSpPr/>
+          <p:nvPr/>
+        </p:nvSpPr>
+        <p:spPr>
+          <a:xfrm>
+            <a:off x="4330995" y="3005470"/>
+            <a:ext cx="3069265" cy="453656"/>
+          </a:xfrm>
+          <a:prstGeom prst="rect">
+            <a:avLst/>
+          </a:prstGeom>
+          <a:solidFill>
+            <a:schemeClr val="bg1"/>
+          </a:solidFill>
+          <a:ln>
+            <a:noFill/>
+          </a:ln>
+        </p:spPr>
+        <p:style>
+          <a:lnRef idx="2">
+            <a:schemeClr val="accent1">
+              <a:shade val="50000"/>
+            </a:schemeClr>
+          </a:lnRef>
+          <a:fillRef idx="1">
+            <a:schemeClr val="accent1"/>
+          </a:fillRef>
+          <a:effectRef idx="0">
+            <a:schemeClr val="accent1"/>
+          </a:effectRef>
+          <a:fontRef idx="minor">
+            <a:schemeClr val="lt1"/>
+          </a:fontRef>
+        </p:style>
+        <p:txBody>
+          <a:bodyPr rtlCol="0" anchor="ctr"/>
+          <a:lstStyle/>
+          <a:p>
+            <a:pPr algn="ctr"/>
+            <a:endParaRPr lang="es-AR"/>
+          </a:p>
+        </p:txBody>
+      </p:sp>
+      <p:sp>
+        <p:nvSpPr>
+          <p:cNvPr id="6" name="TextBox 5"/>
+          <p:cNvSpPr txBox="1"/>
+          <p:nvPr/>
+        </p:nvSpPr>
+        <p:spPr>
+          <a:xfrm>
+            <a:off x="4288468" y="3076353"/>
+            <a:ext cx="2757376" cy="369332"/>
+          </a:xfrm>
+          <a:prstGeom prst="rect">
+            <a:avLst/>
+          </a:prstGeom>
+          <a:noFill/>
+        </p:spPr>
+        <p:txBody>
+          <a:bodyPr wrap="square" rtlCol="0">
+            <a:spAutoFit/>
+          </a:bodyPr>
+          <a:lstStyle/>
+          <a:p>
+            <a:r>
+              <a:rPr lang="es-AR" dirty="0" smtClean="0"/>
+              <a:t>PRINT CUSTOMER COPY ?</a:t>
+            </a:r>
+            <a:endParaRPr lang="es-AR" dirty="0"/>
+          </a:p>
+        </p:txBody>
+      </p:sp>
+    </p:spTree>
+    <p:extLst>
+      <p:ext uri="{BB962C8B-B14F-4D97-AF65-F5344CB8AC3E}">
+        <p14:creationId xmlns:p14="http://schemas.microsoft.com/office/powerpoint/2010/main" val="3611138663"/>
+      </p:ext>
+    </p:extLst>
+  </p:cSld>
+  <p:clrMapOvr>
+    <a:masterClrMapping/>
+  </p:clrMapOvr>
+</p:sld>
+</file>
+
+<file path=ppt/slides/slide13.xml><?xml version="1.0" encoding="utf-8"?>
+<p:sld xmlns:a="http://schemas.openxmlformats.org/drawingml/2006/main" xmlns:r="http://schemas.openxmlformats.org/officeDocument/2006/relationships" xmlns:p="http://schemas.openxmlformats.org/presentationml/2006/main">
+  <p:cSld>
+    <p:spTree>
+      <p:nvGrpSpPr>
+        <p:cNvPr id="1" name=""/>
+        <p:cNvGrpSpPr/>
+        <p:nvPr/>
+      </p:nvGrpSpPr>
+      <p:grpSpPr>
+        <a:xfrm>
+          <a:off x="0" y="0"/>
+          <a:ext cx="0" cy="0"/>
+          <a:chOff x="0" y="0"/>
+          <a:chExt cx="0" cy="0"/>
+        </a:xfrm>
+      </p:grpSpPr>
+      <p:pic>
+        <p:nvPicPr>
+          <p:cNvPr id="4" name="Picture 3"/>
+          <p:cNvPicPr>
+            <a:picLocks noChangeAspect="1"/>
+          </p:cNvPicPr>
+          <p:nvPr/>
+        </p:nvPicPr>
+        <p:blipFill>
+          <a:blip r:embed="rId2">
+            <a:extLst>
+              <a:ext uri="{28A0092B-C50C-407E-A947-70E740481C1C}">
+                <a14:useLocalDpi xmlns:a14="http://schemas.microsoft.com/office/drawing/2010/main" val="0"/>
+              </a:ext>
+            </a:extLst>
+          </a:blip>
+          <a:stretch>
+            <a:fillRect/>
+          </a:stretch>
+        </p:blipFill>
+        <p:spPr>
+          <a:xfrm>
+            <a:off x="2844059" y="990044"/>
+            <a:ext cx="6503882" cy="4877911"/>
+          </a:xfrm>
+          <a:prstGeom prst="rect">
+            <a:avLst/>
+          </a:prstGeom>
+        </p:spPr>
+      </p:pic>
+      <p:sp>
+        <p:nvSpPr>
+          <p:cNvPr id="5" name="Rectangle 4"/>
+          <p:cNvSpPr/>
+          <p:nvPr/>
+        </p:nvSpPr>
+        <p:spPr>
+          <a:xfrm>
+            <a:off x="4614530" y="2693581"/>
+            <a:ext cx="2651051" cy="1162493"/>
+          </a:xfrm>
+          <a:prstGeom prst="rect">
+            <a:avLst/>
+          </a:prstGeom>
+          <a:solidFill>
+            <a:schemeClr val="bg1"/>
+          </a:solidFill>
+          <a:ln>
+            <a:noFill/>
+          </a:ln>
+        </p:spPr>
+        <p:style>
+          <a:lnRef idx="2">
+            <a:schemeClr val="accent1">
+              <a:shade val="50000"/>
+            </a:schemeClr>
+          </a:lnRef>
+          <a:fillRef idx="1">
+            <a:schemeClr val="accent1"/>
+          </a:fillRef>
+          <a:effectRef idx="0">
+            <a:schemeClr val="accent1"/>
+          </a:effectRef>
+          <a:fontRef idx="minor">
+            <a:schemeClr val="lt1"/>
+          </a:fontRef>
+        </p:style>
+        <p:txBody>
+          <a:bodyPr rtlCol="0" anchor="ctr"/>
+          <a:lstStyle/>
+          <a:p>
+            <a:pPr algn="ctr"/>
+            <a:endParaRPr lang="es-AR"/>
+          </a:p>
+        </p:txBody>
+      </p:sp>
+      <p:sp>
+        <p:nvSpPr>
+          <p:cNvPr id="6" name="TextBox 5"/>
+          <p:cNvSpPr txBox="1"/>
+          <p:nvPr/>
+        </p:nvSpPr>
+        <p:spPr>
+          <a:xfrm>
+            <a:off x="4338084" y="2757377"/>
+            <a:ext cx="2927497" cy="923330"/>
+          </a:xfrm>
+          <a:prstGeom prst="rect">
+            <a:avLst/>
+          </a:prstGeom>
+          <a:noFill/>
+        </p:spPr>
+        <p:txBody>
+          <a:bodyPr wrap="square" rtlCol="0">
+            <a:spAutoFit/>
+          </a:bodyPr>
+          <a:lstStyle/>
+          <a:p>
+            <a:r>
+              <a:rPr lang="es-AR" dirty="0" smtClean="0"/>
+              <a:t>Ident inexistente</a:t>
+            </a:r>
+          </a:p>
+          <a:p>
+            <a:endParaRPr lang="es-AR" dirty="0"/>
+          </a:p>
+          <a:p>
+            <a:r>
+              <a:rPr lang="es-AR" dirty="0" smtClean="0"/>
+              <a:t>PRINTING . . .</a:t>
+            </a:r>
+            <a:endParaRPr lang="es-AR" dirty="0"/>
+          </a:p>
+        </p:txBody>
+      </p:sp>
+    </p:spTree>
+    <p:extLst>
+      <p:ext uri="{BB962C8B-B14F-4D97-AF65-F5344CB8AC3E}">
+        <p14:creationId xmlns:p14="http://schemas.microsoft.com/office/powerpoint/2010/main" val="100703592"/>
+      </p:ext>
+    </p:extLst>
+  </p:cSld>
+  <p:clrMapOvr>
+    <a:masterClrMapping/>
+  </p:clrMapOvr>
+</p:sld>
+</file>
+
+<file path=ppt/slides/slide14.xml><?xml version="1.0" encoding="utf-8"?>
+<p:sld xmlns:a="http://schemas.openxmlformats.org/drawingml/2006/main" xmlns:r="http://schemas.openxmlformats.org/officeDocument/2006/relationships" xmlns:p="http://schemas.openxmlformats.org/presentationml/2006/main">
+  <p:cSld>
+    <p:spTree>
+      <p:nvGrpSpPr>
+        <p:cNvPr id="1" name=""/>
+        <p:cNvGrpSpPr/>
+        <p:nvPr/>
+      </p:nvGrpSpPr>
+      <p:grpSpPr>
+        <a:xfrm>
+          <a:off x="0" y="0"/>
+          <a:ext cx="0" cy="0"/>
+          <a:chOff x="0" y="0"/>
+          <a:chExt cx="0" cy="0"/>
+        </a:xfrm>
+      </p:grpSpPr>
+      <p:pic>
+        <p:nvPicPr>
+          <p:cNvPr id="4" name="Picture 3"/>
+          <p:cNvPicPr>
+            <a:picLocks noChangeAspect="1"/>
+          </p:cNvPicPr>
+          <p:nvPr/>
+        </p:nvPicPr>
+        <p:blipFill>
+          <a:blip r:embed="rId2">
+            <a:extLst>
+              <a:ext uri="{28A0092B-C50C-407E-A947-70E740481C1C}">
+                <a14:useLocalDpi xmlns:a14="http://schemas.microsoft.com/office/drawing/2010/main" val="0"/>
+              </a:ext>
+            </a:extLst>
+          </a:blip>
+          <a:stretch>
+            <a:fillRect/>
+          </a:stretch>
+        </p:blipFill>
+        <p:spPr>
+          <a:xfrm>
+            <a:off x="2844059" y="990044"/>
+            <a:ext cx="6503882" cy="4877911"/>
+          </a:xfrm>
+          <a:prstGeom prst="rect">
+            <a:avLst/>
+          </a:prstGeom>
+        </p:spPr>
+      </p:pic>
+      <p:sp>
+        <p:nvSpPr>
+          <p:cNvPr id="5" name="Rectangle 4"/>
+          <p:cNvSpPr/>
+          <p:nvPr/>
+        </p:nvSpPr>
+        <p:spPr>
+          <a:xfrm>
+            <a:off x="4366437" y="2431312"/>
+            <a:ext cx="2962940" cy="878958"/>
+          </a:xfrm>
+          <a:prstGeom prst="rect">
+            <a:avLst/>
+          </a:prstGeom>
+          <a:solidFill>
+            <a:schemeClr val="bg1"/>
+          </a:solidFill>
+          <a:ln>
+            <a:noFill/>
+          </a:ln>
+        </p:spPr>
+        <p:style>
+          <a:lnRef idx="2">
+            <a:schemeClr val="accent1">
+              <a:shade val="50000"/>
+            </a:schemeClr>
+          </a:lnRef>
+          <a:fillRef idx="1">
+            <a:schemeClr val="accent1"/>
+          </a:fillRef>
+          <a:effectRef idx="0">
+            <a:schemeClr val="accent1"/>
+          </a:effectRef>
+          <a:fontRef idx="minor">
+            <a:schemeClr val="lt1"/>
+          </a:fontRef>
+        </p:style>
+        <p:txBody>
+          <a:bodyPr rtlCol="0" anchor="ctr"/>
+          <a:lstStyle/>
+          <a:p>
+            <a:pPr algn="ctr"/>
+            <a:endParaRPr lang="es-AR"/>
+          </a:p>
+        </p:txBody>
+      </p:sp>
+      <p:sp>
+        <p:nvSpPr>
+          <p:cNvPr id="7" name="Rectangle 6"/>
+          <p:cNvSpPr/>
+          <p:nvPr/>
+        </p:nvSpPr>
+        <p:spPr>
+          <a:xfrm>
+            <a:off x="4366437" y="3522921"/>
+            <a:ext cx="2296633" cy="730102"/>
+          </a:xfrm>
+          <a:prstGeom prst="rect">
+            <a:avLst/>
+          </a:prstGeom>
+          <a:solidFill>
+            <a:schemeClr val="bg1"/>
+          </a:solidFill>
+          <a:ln>
+            <a:noFill/>
+          </a:ln>
+        </p:spPr>
+        <p:style>
+          <a:lnRef idx="2">
+            <a:schemeClr val="accent1">
+              <a:shade val="50000"/>
+            </a:schemeClr>
+          </a:lnRef>
+          <a:fillRef idx="1">
+            <a:schemeClr val="accent1"/>
+          </a:fillRef>
+          <a:effectRef idx="0">
+            <a:schemeClr val="accent1"/>
+          </a:effectRef>
+          <a:fontRef idx="minor">
+            <a:schemeClr val="lt1"/>
+          </a:fontRef>
+        </p:style>
+        <p:txBody>
+          <a:bodyPr rtlCol="0" anchor="ctr"/>
+          <a:lstStyle/>
+          <a:p>
+            <a:pPr algn="ctr"/>
+            <a:endParaRPr lang="es-AR"/>
+          </a:p>
+        </p:txBody>
+      </p:sp>
+      <p:sp>
+        <p:nvSpPr>
+          <p:cNvPr id="8" name="TextBox 7"/>
+          <p:cNvSpPr txBox="1"/>
+          <p:nvPr/>
+        </p:nvSpPr>
+        <p:spPr>
+          <a:xfrm>
+            <a:off x="4366437" y="2431312"/>
+            <a:ext cx="2962940" cy="2585323"/>
+          </a:xfrm>
+          <a:prstGeom prst="rect">
+            <a:avLst/>
+          </a:prstGeom>
+          <a:noFill/>
+        </p:spPr>
+        <p:txBody>
+          <a:bodyPr wrap="square" rtlCol="0">
+            <a:spAutoFit/>
+          </a:bodyPr>
+          <a:lstStyle/>
+          <a:p>
+            <a:r>
+              <a:rPr lang="es-AR" dirty="0" smtClean="0"/>
+              <a:t>1 BATCH CLOSE</a:t>
+            </a:r>
+          </a:p>
+          <a:p>
+            <a:r>
+              <a:rPr lang="es-AR" dirty="0" smtClean="0"/>
+              <a:t>2 REPRINT LAST</a:t>
+            </a:r>
+          </a:p>
+          <a:p>
+            <a:r>
+              <a:rPr lang="es-AR" dirty="0" smtClean="0"/>
+              <a:t>3 VOID TRANSACTION</a:t>
+            </a:r>
+          </a:p>
+          <a:p>
+            <a:endParaRPr lang="es-AR" dirty="0"/>
+          </a:p>
+          <a:p>
+            <a:endParaRPr lang="es-AR" dirty="0" smtClean="0"/>
+          </a:p>
+          <a:p>
+            <a:r>
+              <a:rPr lang="es-AR" dirty="0" smtClean="0"/>
+              <a:t>8 CONFIGURATION</a:t>
+            </a:r>
+          </a:p>
+          <a:p>
+            <a:pPr marL="342900" indent="-342900">
+              <a:buAutoNum type="arabicPlain" startAt="3"/>
+            </a:pPr>
+            <a:endParaRPr lang="es-AR" dirty="0"/>
+          </a:p>
+          <a:p>
+            <a:pPr marL="342900" indent="-342900">
+              <a:buAutoNum type="arabicPlain" startAt="3"/>
+            </a:pPr>
+            <a:endParaRPr lang="es-AR" dirty="0" smtClean="0"/>
+          </a:p>
+          <a:p>
+            <a:pPr marL="342900" indent="-342900">
+              <a:buAutoNum type="arabicPlain" startAt="3"/>
+            </a:pPr>
+            <a:endParaRPr lang="es-AR" dirty="0"/>
+          </a:p>
+        </p:txBody>
+      </p:sp>
+    </p:spTree>
+    <p:extLst>
+      <p:ext uri="{BB962C8B-B14F-4D97-AF65-F5344CB8AC3E}">
+        <p14:creationId xmlns:p14="http://schemas.microsoft.com/office/powerpoint/2010/main" val="3454833470"/>
+      </p:ext>
+    </p:extLst>
+  </p:cSld>
+  <p:clrMapOvr>
+    <a:masterClrMapping/>
+  </p:clrMapOvr>
+</p:sld>
+</file>
+
+<file path=ppt/slides/slide15.xml><?xml version="1.0" encoding="utf-8"?>
+<p:sld xmlns:a="http://schemas.openxmlformats.org/drawingml/2006/main" xmlns:r="http://schemas.openxmlformats.org/officeDocument/2006/relationships" xmlns:p="http://schemas.openxmlformats.org/presentationml/2006/main">
+  <p:cSld>
+    <p:spTree>
+      <p:nvGrpSpPr>
+        <p:cNvPr id="1" name=""/>
+        <p:cNvGrpSpPr/>
+        <p:nvPr/>
+      </p:nvGrpSpPr>
+      <p:grpSpPr>
+        <a:xfrm>
+          <a:off x="0" y="0"/>
+          <a:ext cx="0" cy="0"/>
+          <a:chOff x="0" y="0"/>
+          <a:chExt cx="0" cy="0"/>
+        </a:xfrm>
+      </p:grpSpPr>
+      <p:pic>
+        <p:nvPicPr>
+          <p:cNvPr id="4" name="Picture 3"/>
+          <p:cNvPicPr>
+            <a:picLocks noChangeAspect="1"/>
+          </p:cNvPicPr>
+          <p:nvPr/>
+        </p:nvPicPr>
+        <p:blipFill>
+          <a:blip r:embed="rId2">
+            <a:extLst>
+              <a:ext uri="{28A0092B-C50C-407E-A947-70E740481C1C}">
+                <a14:useLocalDpi xmlns:a14="http://schemas.microsoft.com/office/drawing/2010/main" val="0"/>
+              </a:ext>
+            </a:extLst>
+          </a:blip>
+          <a:stretch>
+            <a:fillRect/>
+          </a:stretch>
+        </p:blipFill>
+        <p:spPr>
+          <a:xfrm>
+            <a:off x="2844059" y="990044"/>
+            <a:ext cx="6503882" cy="4877911"/>
+          </a:xfrm>
+          <a:prstGeom prst="rect">
+            <a:avLst/>
+          </a:prstGeom>
+        </p:spPr>
+      </p:pic>
+      <p:sp>
+        <p:nvSpPr>
+          <p:cNvPr id="5" name="Rectangle 4"/>
+          <p:cNvSpPr/>
+          <p:nvPr/>
+        </p:nvSpPr>
+        <p:spPr>
+          <a:xfrm>
+            <a:off x="4330995" y="2445488"/>
+            <a:ext cx="2984205" cy="935665"/>
+          </a:xfrm>
+          <a:prstGeom prst="rect">
+            <a:avLst/>
+          </a:prstGeom>
+          <a:solidFill>
+            <a:schemeClr val="bg1"/>
+          </a:solidFill>
+          <a:ln>
+            <a:noFill/>
+          </a:ln>
+        </p:spPr>
+        <p:style>
+          <a:lnRef idx="2">
+            <a:schemeClr val="accent1">
+              <a:shade val="50000"/>
+            </a:schemeClr>
+          </a:lnRef>
+          <a:fillRef idx="1">
+            <a:schemeClr val="accent1"/>
+          </a:fillRef>
+          <a:effectRef idx="0">
+            <a:schemeClr val="accent1"/>
+          </a:effectRef>
+          <a:fontRef idx="minor">
+            <a:schemeClr val="lt1"/>
+          </a:fontRef>
+        </p:style>
+        <p:txBody>
+          <a:bodyPr rtlCol="0" anchor="ctr"/>
+          <a:lstStyle/>
+          <a:p>
+            <a:pPr algn="ctr"/>
+            <a:endParaRPr lang="es-AR"/>
+          </a:p>
+        </p:txBody>
+      </p:sp>
+      <p:sp>
+        <p:nvSpPr>
+          <p:cNvPr id="6" name="TextBox 5"/>
+          <p:cNvSpPr txBox="1"/>
+          <p:nvPr/>
+        </p:nvSpPr>
+        <p:spPr>
+          <a:xfrm>
+            <a:off x="4437321" y="2445487"/>
+            <a:ext cx="2934586" cy="923330"/>
+          </a:xfrm>
+          <a:prstGeom prst="rect">
+            <a:avLst/>
+          </a:prstGeom>
+          <a:noFill/>
+        </p:spPr>
+        <p:txBody>
+          <a:bodyPr wrap="square" rtlCol="0">
+            <a:spAutoFit/>
+          </a:bodyPr>
+          <a:lstStyle/>
+          <a:p>
+            <a:r>
+              <a:rPr lang="es-AR" dirty="0" smtClean="0"/>
+              <a:t>  INSERT PASSWORD</a:t>
+            </a:r>
+          </a:p>
+          <a:p>
+            <a:endParaRPr lang="es-AR" dirty="0" smtClean="0"/>
+          </a:p>
+          <a:p>
+            <a:r>
+              <a:rPr lang="es-AR" dirty="0" smtClean="0"/>
+              <a:t>PASSWORD:</a:t>
+            </a:r>
+            <a:endParaRPr lang="es-AR" dirty="0"/>
+          </a:p>
+        </p:txBody>
+      </p:sp>
+    </p:spTree>
+    <p:extLst>
+      <p:ext uri="{BB962C8B-B14F-4D97-AF65-F5344CB8AC3E}">
+        <p14:creationId xmlns:p14="http://schemas.microsoft.com/office/powerpoint/2010/main" val="648400013"/>
+      </p:ext>
+    </p:extLst>
+  </p:cSld>
+  <p:clrMapOvr>
+    <a:masterClrMapping/>
+  </p:clrMapOvr>
+</p:sld>
+</file>
+
+<file path=ppt/slides/slide16.xml><?xml version="1.0" encoding="utf-8"?>
+<p:sld xmlns:a="http://schemas.openxmlformats.org/drawingml/2006/main" xmlns:r="http://schemas.openxmlformats.org/officeDocument/2006/relationships" xmlns:p="http://schemas.openxmlformats.org/presentationml/2006/main">
+  <p:cSld>
+    <p:spTree>
+      <p:nvGrpSpPr>
+        <p:cNvPr id="1" name=""/>
+        <p:cNvGrpSpPr/>
+        <p:nvPr/>
+      </p:nvGrpSpPr>
+      <p:grpSpPr>
+        <a:xfrm>
+          <a:off x="0" y="0"/>
+          <a:ext cx="0" cy="0"/>
+          <a:chOff x="0" y="0"/>
+          <a:chExt cx="0" cy="0"/>
+        </a:xfrm>
+      </p:grpSpPr>
+      <p:pic>
+        <p:nvPicPr>
+          <p:cNvPr id="4" name="Picture 3"/>
+          <p:cNvPicPr>
+            <a:picLocks noChangeAspect="1"/>
+          </p:cNvPicPr>
+          <p:nvPr/>
+        </p:nvPicPr>
+        <p:blipFill>
+          <a:blip r:embed="rId2">
+            <a:extLst>
+              <a:ext uri="{28A0092B-C50C-407E-A947-70E740481C1C}">
+                <a14:useLocalDpi xmlns:a14="http://schemas.microsoft.com/office/drawing/2010/main" val="0"/>
+              </a:ext>
+            </a:extLst>
+          </a:blip>
+          <a:stretch>
+            <a:fillRect/>
+          </a:stretch>
+        </p:blipFill>
+        <p:spPr>
+          <a:xfrm>
+            <a:off x="2844059" y="990044"/>
+            <a:ext cx="6503882" cy="4877911"/>
+          </a:xfrm>
+          <a:prstGeom prst="rect">
+            <a:avLst/>
+          </a:prstGeom>
+        </p:spPr>
+      </p:pic>
+      <p:sp>
+        <p:nvSpPr>
+          <p:cNvPr id="5" name="Rectangle 4"/>
+          <p:cNvSpPr/>
+          <p:nvPr/>
+        </p:nvSpPr>
+        <p:spPr>
+          <a:xfrm>
+            <a:off x="4330995" y="2445488"/>
+            <a:ext cx="2984205" cy="935665"/>
+          </a:xfrm>
+          <a:prstGeom prst="rect">
+            <a:avLst/>
+          </a:prstGeom>
+          <a:solidFill>
+            <a:schemeClr val="bg1"/>
+          </a:solidFill>
+          <a:ln>
+            <a:noFill/>
+          </a:ln>
+        </p:spPr>
+        <p:style>
+          <a:lnRef idx="2">
+            <a:schemeClr val="accent1">
+              <a:shade val="50000"/>
+            </a:schemeClr>
+          </a:lnRef>
+          <a:fillRef idx="1">
+            <a:schemeClr val="accent1"/>
+          </a:fillRef>
+          <a:effectRef idx="0">
+            <a:schemeClr val="accent1"/>
+          </a:effectRef>
+          <a:fontRef idx="minor">
+            <a:schemeClr val="lt1"/>
+          </a:fontRef>
+        </p:style>
+        <p:txBody>
+          <a:bodyPr rtlCol="0" anchor="ctr"/>
+          <a:lstStyle/>
+          <a:p>
+            <a:pPr algn="ctr"/>
+            <a:endParaRPr lang="es-AR"/>
+          </a:p>
+        </p:txBody>
+      </p:sp>
+      <p:sp>
+        <p:nvSpPr>
+          <p:cNvPr id="6" name="TextBox 5"/>
+          <p:cNvSpPr txBox="1"/>
+          <p:nvPr/>
+        </p:nvSpPr>
+        <p:spPr>
+          <a:xfrm>
+            <a:off x="4437321" y="2445487"/>
+            <a:ext cx="2934586" cy="923330"/>
+          </a:xfrm>
+          <a:prstGeom prst="rect">
+            <a:avLst/>
+          </a:prstGeom>
+          <a:noFill/>
+        </p:spPr>
+        <p:txBody>
+          <a:bodyPr wrap="square" rtlCol="0">
+            <a:spAutoFit/>
+          </a:bodyPr>
+          <a:lstStyle/>
+          <a:p>
+            <a:r>
+              <a:rPr lang="es-AR" dirty="0" smtClean="0"/>
+              <a:t>  INSERT NEW PASSWORD</a:t>
+            </a:r>
+          </a:p>
+          <a:p>
+            <a:endParaRPr lang="es-AR" dirty="0" smtClean="0"/>
+          </a:p>
+          <a:p>
+            <a:r>
+              <a:rPr lang="es-AR" dirty="0" smtClean="0"/>
+              <a:t>PASSWORD:</a:t>
+            </a:r>
+            <a:endParaRPr lang="es-AR" dirty="0"/>
+          </a:p>
+        </p:txBody>
+      </p:sp>
+    </p:spTree>
+    <p:extLst>
+      <p:ext uri="{BB962C8B-B14F-4D97-AF65-F5344CB8AC3E}">
+        <p14:creationId xmlns:p14="http://schemas.microsoft.com/office/powerpoint/2010/main" val="684627012"/>
+      </p:ext>
+    </p:extLst>
+  </p:cSld>
+  <p:clrMapOvr>
+    <a:masterClrMapping/>
+  </p:clrMapOvr>
+</p:sld>
+</file>
+
+<file path=ppt/slides/slide17.xml><?xml version="1.0" encoding="utf-8"?>
+<p:sld xmlns:a="http://schemas.openxmlformats.org/drawingml/2006/main" xmlns:r="http://schemas.openxmlformats.org/officeDocument/2006/relationships" xmlns:p="http://schemas.openxmlformats.org/presentationml/2006/main">
+  <p:cSld>
+    <p:spTree>
+      <p:nvGrpSpPr>
+        <p:cNvPr id="1" name=""/>
+        <p:cNvGrpSpPr/>
+        <p:nvPr/>
+      </p:nvGrpSpPr>
+      <p:grpSpPr>
+        <a:xfrm>
+          <a:off x="0" y="0"/>
+          <a:ext cx="0" cy="0"/>
+          <a:chOff x="0" y="0"/>
+          <a:chExt cx="0" cy="0"/>
+        </a:xfrm>
+      </p:grpSpPr>
+      <p:pic>
+        <p:nvPicPr>
+          <p:cNvPr id="4" name="Picture 3"/>
+          <p:cNvPicPr>
+            <a:picLocks noChangeAspect="1"/>
+          </p:cNvPicPr>
+          <p:nvPr/>
+        </p:nvPicPr>
+        <p:blipFill>
+          <a:blip r:embed="rId2">
+            <a:extLst>
+              <a:ext uri="{28A0092B-C50C-407E-A947-70E740481C1C}">
+                <a14:useLocalDpi xmlns:a14="http://schemas.microsoft.com/office/drawing/2010/main" val="0"/>
+              </a:ext>
+            </a:extLst>
+          </a:blip>
+          <a:stretch>
+            <a:fillRect/>
+          </a:stretch>
+        </p:blipFill>
+        <p:spPr>
+          <a:xfrm>
+            <a:off x="3113520" y="568357"/>
+            <a:ext cx="4306281" cy="5551165"/>
+          </a:xfrm>
+          <a:prstGeom prst="rect">
+            <a:avLst/>
+          </a:prstGeom>
+        </p:spPr>
+      </p:pic>
+      <p:sp>
+        <p:nvSpPr>
+          <p:cNvPr id="6" name="Rectangle 5"/>
+          <p:cNvSpPr/>
+          <p:nvPr/>
+        </p:nvSpPr>
+        <p:spPr>
+          <a:xfrm>
+            <a:off x="3756837" y="1240466"/>
+            <a:ext cx="2658140" cy="1828800"/>
+          </a:xfrm>
+          <a:prstGeom prst="rect">
+            <a:avLst/>
+          </a:prstGeom>
+          <a:solidFill>
+            <a:schemeClr val="bg1"/>
+          </a:solidFill>
+          <a:ln>
+            <a:noFill/>
+          </a:ln>
+        </p:spPr>
+        <p:style>
+          <a:lnRef idx="2">
+            <a:schemeClr val="accent1">
+              <a:shade val="50000"/>
+            </a:schemeClr>
+          </a:lnRef>
+          <a:fillRef idx="1">
+            <a:schemeClr val="accent1"/>
+          </a:fillRef>
+          <a:effectRef idx="0">
+            <a:schemeClr val="accent1"/>
+          </a:effectRef>
+          <a:fontRef idx="minor">
+            <a:schemeClr val="lt1"/>
+          </a:fontRef>
+        </p:style>
+        <p:txBody>
+          <a:bodyPr rtlCol="0" anchor="ctr"/>
+          <a:lstStyle/>
+          <a:p>
+            <a:pPr algn="ctr"/>
+            <a:endParaRPr lang="es-AR"/>
+          </a:p>
+        </p:txBody>
+      </p:sp>
+      <p:sp>
+        <p:nvSpPr>
+          <p:cNvPr id="7" name="TextBox 6"/>
+          <p:cNvSpPr txBox="1"/>
+          <p:nvPr/>
+        </p:nvSpPr>
+        <p:spPr>
+          <a:xfrm>
+            <a:off x="4664149" y="1190847"/>
+            <a:ext cx="1332614" cy="246221"/>
+          </a:xfrm>
+          <a:prstGeom prst="rect">
+            <a:avLst/>
+          </a:prstGeom>
+          <a:noFill/>
+        </p:spPr>
+        <p:txBody>
+          <a:bodyPr wrap="square" rtlCol="0">
+            <a:spAutoFit/>
+          </a:bodyPr>
+          <a:lstStyle/>
+          <a:p>
+            <a:r>
+              <a:rPr lang="es-AR" sz="1000" dirty="0" smtClean="0"/>
+              <a:t>(Batch Close)</a:t>
+            </a:r>
+            <a:endParaRPr lang="es-AR" sz="1000" dirty="0"/>
+          </a:p>
+        </p:txBody>
+      </p:sp>
+      <p:sp>
+        <p:nvSpPr>
+          <p:cNvPr id="8" name="TextBox 7"/>
+          <p:cNvSpPr txBox="1"/>
+          <p:nvPr/>
+        </p:nvSpPr>
+        <p:spPr>
+          <a:xfrm>
+            <a:off x="3678865" y="1467295"/>
+            <a:ext cx="2693582" cy="1600438"/>
+          </a:xfrm>
+          <a:prstGeom prst="rect">
+            <a:avLst/>
+          </a:prstGeom>
+          <a:noFill/>
+        </p:spPr>
+        <p:txBody>
+          <a:bodyPr wrap="square" rtlCol="0">
+            <a:spAutoFit/>
+          </a:bodyPr>
+          <a:lstStyle/>
+          <a:p>
+            <a:r>
+              <a:rPr lang="es-AR" sz="1400" dirty="0" smtClean="0"/>
+              <a:t>TERMINAL ID:   AN1888</a:t>
+            </a:r>
+          </a:p>
+          <a:p>
+            <a:r>
+              <a:rPr lang="es-AR" sz="1400" dirty="0" smtClean="0"/>
+              <a:t>BATCH ID:   15061600</a:t>
+            </a:r>
+          </a:p>
+          <a:p>
+            <a:r>
+              <a:rPr lang="es-AR" sz="1400" dirty="0" smtClean="0"/>
+              <a:t>SALES:   2</a:t>
+            </a:r>
+          </a:p>
+          <a:p>
+            <a:r>
+              <a:rPr lang="es-AR" sz="1400" dirty="0" smtClean="0"/>
+              <a:t>TOTAL SALES:   300.00</a:t>
+            </a:r>
+          </a:p>
+          <a:p>
+            <a:r>
+              <a:rPr lang="es-AR" sz="1400" dirty="0" smtClean="0"/>
+              <a:t>VOID:   0</a:t>
+            </a:r>
+          </a:p>
+          <a:p>
+            <a:r>
+              <a:rPr lang="es-AR" sz="1400" dirty="0" smtClean="0"/>
+              <a:t>TOTAL VOID:   0.00</a:t>
+            </a:r>
+          </a:p>
+          <a:p>
+            <a:endParaRPr lang="es-AR" sz="1400" dirty="0"/>
+          </a:p>
+        </p:txBody>
+      </p:sp>
+      <p:sp>
+        <p:nvSpPr>
+          <p:cNvPr id="9" name="TextBox 8"/>
+          <p:cNvSpPr txBox="1"/>
+          <p:nvPr/>
+        </p:nvSpPr>
+        <p:spPr>
+          <a:xfrm>
+            <a:off x="4550735" y="2856619"/>
+            <a:ext cx="1446028" cy="253916"/>
+          </a:xfrm>
+          <a:prstGeom prst="rect">
+            <a:avLst/>
+          </a:prstGeom>
+          <a:noFill/>
+        </p:spPr>
+        <p:txBody>
+          <a:bodyPr wrap="square" rtlCol="0">
+            <a:spAutoFit/>
+          </a:bodyPr>
+          <a:lstStyle/>
+          <a:p>
+            <a:r>
+              <a:rPr lang="es-AR" sz="1050" dirty="0" smtClean="0"/>
+              <a:t>Authorized (00000)</a:t>
+            </a:r>
+            <a:endParaRPr lang="es-AR" sz="1050" dirty="0"/>
+          </a:p>
+        </p:txBody>
+      </p:sp>
+      <p:sp>
+        <p:nvSpPr>
+          <p:cNvPr id="10" name="Rectangle 9"/>
+          <p:cNvSpPr/>
+          <p:nvPr/>
+        </p:nvSpPr>
+        <p:spPr>
+          <a:xfrm>
+            <a:off x="3678865" y="4841359"/>
+            <a:ext cx="1828800" cy="517451"/>
+          </a:xfrm>
+          <a:prstGeom prst="rect">
+            <a:avLst/>
+          </a:prstGeom>
+          <a:solidFill>
+            <a:schemeClr val="bg1"/>
+          </a:solidFill>
+          <a:ln>
+            <a:noFill/>
+          </a:ln>
+        </p:spPr>
+        <p:style>
+          <a:lnRef idx="2">
+            <a:schemeClr val="accent1">
+              <a:shade val="50000"/>
+            </a:schemeClr>
+          </a:lnRef>
+          <a:fillRef idx="1">
+            <a:schemeClr val="accent1"/>
+          </a:fillRef>
+          <a:effectRef idx="0">
+            <a:schemeClr val="accent1"/>
+          </a:effectRef>
+          <a:fontRef idx="minor">
+            <a:schemeClr val="lt1"/>
+          </a:fontRef>
+        </p:style>
+        <p:txBody>
+          <a:bodyPr rtlCol="0" anchor="ctr"/>
+          <a:lstStyle/>
+          <a:p>
+            <a:pPr algn="ctr"/>
+            <a:endParaRPr lang="es-AR"/>
+          </a:p>
+        </p:txBody>
+      </p:sp>
+      <p:sp>
+        <p:nvSpPr>
+          <p:cNvPr id="11" name="TextBox 10"/>
+          <p:cNvSpPr txBox="1"/>
+          <p:nvPr/>
+        </p:nvSpPr>
+        <p:spPr>
+          <a:xfrm>
+            <a:off x="3792276" y="4912242"/>
+            <a:ext cx="2445489" cy="369332"/>
+          </a:xfrm>
+          <a:prstGeom prst="rect">
+            <a:avLst/>
+          </a:prstGeom>
+          <a:noFill/>
+        </p:spPr>
+        <p:txBody>
+          <a:bodyPr wrap="square" rtlCol="0">
+            <a:spAutoFit/>
+          </a:bodyPr>
+          <a:lstStyle/>
+          <a:p>
+            <a:r>
+              <a:rPr lang="es-AR" dirty="0" smtClean="0"/>
+              <a:t>COMPLETED</a:t>
+            </a:r>
+            <a:endParaRPr lang="es-AR" dirty="0"/>
+          </a:p>
+        </p:txBody>
+      </p:sp>
+    </p:spTree>
+    <p:extLst>
+      <p:ext uri="{BB962C8B-B14F-4D97-AF65-F5344CB8AC3E}">
+        <p14:creationId xmlns:p14="http://schemas.microsoft.com/office/powerpoint/2010/main" val="4152851379"/>
+      </p:ext>
+    </p:extLst>
+  </p:cSld>
+  <p:clrMapOvr>
+    <a:masterClrMapping/>
+  </p:clrMapOvr>
+</p:sld>
+</file>
+
+<file path=ppt/slides/slide18.xml><?xml version="1.0" encoding="utf-8"?>
+<p:sld xmlns:a="http://schemas.openxmlformats.org/drawingml/2006/main" xmlns:r="http://schemas.openxmlformats.org/officeDocument/2006/relationships" xmlns:p="http://schemas.openxmlformats.org/presentationml/2006/main">
+  <p:cSld>
+    <p:spTree>
+      <p:nvGrpSpPr>
+        <p:cNvPr id="1" name=""/>
+        <p:cNvGrpSpPr/>
+        <p:nvPr/>
+      </p:nvGrpSpPr>
+      <p:grpSpPr>
+        <a:xfrm>
+          <a:off x="0" y="0"/>
+          <a:ext cx="0" cy="0"/>
+          <a:chOff x="0" y="0"/>
+          <a:chExt cx="0" cy="0"/>
+        </a:xfrm>
+      </p:grpSpPr>
+      <p:pic>
+        <p:nvPicPr>
+          <p:cNvPr id="4" name="Picture 3"/>
+          <p:cNvPicPr>
+            <a:picLocks noChangeAspect="1"/>
+          </p:cNvPicPr>
+          <p:nvPr/>
+        </p:nvPicPr>
+        <p:blipFill>
+          <a:blip r:embed="rId2">
+            <a:extLst>
+              <a:ext uri="{28A0092B-C50C-407E-A947-70E740481C1C}">
+                <a14:useLocalDpi xmlns:a14="http://schemas.microsoft.com/office/drawing/2010/main" val="0"/>
+              </a:ext>
+            </a:extLst>
+          </a:blip>
+          <a:stretch>
+            <a:fillRect/>
+          </a:stretch>
+        </p:blipFill>
+        <p:spPr>
+          <a:xfrm>
+            <a:off x="2844059" y="990044"/>
+            <a:ext cx="6503882" cy="4877911"/>
+          </a:xfrm>
+          <a:prstGeom prst="rect">
+            <a:avLst/>
+          </a:prstGeom>
+        </p:spPr>
+      </p:pic>
+      <p:sp>
+        <p:nvSpPr>
+          <p:cNvPr id="5" name="Rectangle 4"/>
+          <p:cNvSpPr/>
+          <p:nvPr/>
+        </p:nvSpPr>
+        <p:spPr>
+          <a:xfrm>
+            <a:off x="4423144" y="3069265"/>
+            <a:ext cx="2736112" cy="666307"/>
+          </a:xfrm>
+          <a:prstGeom prst="rect">
+            <a:avLst/>
+          </a:prstGeom>
+          <a:solidFill>
+            <a:schemeClr val="bg1"/>
+          </a:solidFill>
+          <a:ln>
+            <a:noFill/>
+          </a:ln>
+        </p:spPr>
+        <p:style>
+          <a:lnRef idx="2">
+            <a:schemeClr val="accent1">
+              <a:shade val="50000"/>
+            </a:schemeClr>
+          </a:lnRef>
+          <a:fillRef idx="1">
+            <a:schemeClr val="accent1"/>
+          </a:fillRef>
+          <a:effectRef idx="0">
+            <a:schemeClr val="accent1"/>
+          </a:effectRef>
+          <a:fontRef idx="minor">
+            <a:schemeClr val="lt1"/>
+          </a:fontRef>
+        </p:style>
+        <p:txBody>
+          <a:bodyPr rtlCol="0" anchor="ctr"/>
+          <a:lstStyle/>
+          <a:p>
+            <a:pPr algn="ctr"/>
+            <a:endParaRPr lang="es-AR"/>
+          </a:p>
+        </p:txBody>
+      </p:sp>
+      <p:sp>
+        <p:nvSpPr>
+          <p:cNvPr id="6" name="TextBox 5"/>
+          <p:cNvSpPr txBox="1"/>
+          <p:nvPr/>
+        </p:nvSpPr>
+        <p:spPr>
+          <a:xfrm>
+            <a:off x="4366437" y="3069265"/>
+            <a:ext cx="2899144" cy="369332"/>
+          </a:xfrm>
+          <a:prstGeom prst="rect">
+            <a:avLst/>
+          </a:prstGeom>
+          <a:noFill/>
+        </p:spPr>
+        <p:txBody>
+          <a:bodyPr wrap="square" rtlCol="0">
+            <a:spAutoFit/>
+          </a:bodyPr>
+          <a:lstStyle/>
+          <a:p>
+            <a:r>
+              <a:rPr lang="es-AR" dirty="0" smtClean="0"/>
+              <a:t>PRINTING . . .</a:t>
+            </a:r>
+            <a:endParaRPr lang="es-AR" dirty="0"/>
+          </a:p>
+        </p:txBody>
+      </p:sp>
+    </p:spTree>
+    <p:extLst>
+      <p:ext uri="{BB962C8B-B14F-4D97-AF65-F5344CB8AC3E}">
+        <p14:creationId xmlns:p14="http://schemas.microsoft.com/office/powerpoint/2010/main" val="2453644473"/>
+      </p:ext>
+    </p:extLst>
+  </p:cSld>
+  <p:clrMapOvr>
+    <a:masterClrMapping/>
+  </p:clrMapOvr>
+</p:sld>
+</file>
+
+<file path=ppt/slides/slide19.xml><?xml version="1.0" encoding="utf-8"?>
+<p:sld xmlns:a="http://schemas.openxmlformats.org/drawingml/2006/main" xmlns:r="http://schemas.openxmlformats.org/officeDocument/2006/relationships" xmlns:p="http://schemas.openxmlformats.org/presentationml/2006/main">
+  <p:cSld>
+    <p:spTree>
+      <p:nvGrpSpPr>
+        <p:cNvPr id="1" name=""/>
+        <p:cNvGrpSpPr/>
+        <p:nvPr/>
+      </p:nvGrpSpPr>
+      <p:grpSpPr>
+        <a:xfrm>
+          <a:off x="0" y="0"/>
+          <a:ext cx="0" cy="0"/>
+          <a:chOff x="0" y="0"/>
+          <a:chExt cx="0" cy="0"/>
+        </a:xfrm>
+      </p:grpSpPr>
+      <p:pic>
+        <p:nvPicPr>
+          <p:cNvPr id="4" name="Picture 3"/>
+          <p:cNvPicPr>
+            <a:picLocks noChangeAspect="1"/>
+          </p:cNvPicPr>
+          <p:nvPr/>
+        </p:nvPicPr>
+        <p:blipFill>
+          <a:blip r:embed="rId2">
+            <a:extLst>
+              <a:ext uri="{28A0092B-C50C-407E-A947-70E740481C1C}">
+                <a14:useLocalDpi xmlns:a14="http://schemas.microsoft.com/office/drawing/2010/main" val="0"/>
+              </a:ext>
+            </a:extLst>
+          </a:blip>
+          <a:stretch>
+            <a:fillRect/>
+          </a:stretch>
+        </p:blipFill>
+        <p:spPr>
+          <a:xfrm>
+            <a:off x="2844059" y="990044"/>
+            <a:ext cx="6503882" cy="4877911"/>
+          </a:xfrm>
+          <a:prstGeom prst="rect">
+            <a:avLst/>
+          </a:prstGeom>
+        </p:spPr>
+      </p:pic>
+      <p:sp>
+        <p:nvSpPr>
+          <p:cNvPr id="5" name="Rectangle 4"/>
+          <p:cNvSpPr/>
+          <p:nvPr/>
+        </p:nvSpPr>
+        <p:spPr>
+          <a:xfrm>
+            <a:off x="4316819" y="3090530"/>
+            <a:ext cx="2317897" cy="482010"/>
+          </a:xfrm>
+          <a:prstGeom prst="rect">
+            <a:avLst/>
+          </a:prstGeom>
+          <a:solidFill>
+            <a:schemeClr val="bg1"/>
+          </a:solidFill>
+          <a:ln>
+            <a:noFill/>
+          </a:ln>
+        </p:spPr>
+        <p:style>
+          <a:lnRef idx="2">
+            <a:schemeClr val="accent1">
+              <a:shade val="50000"/>
+            </a:schemeClr>
+          </a:lnRef>
+          <a:fillRef idx="1">
+            <a:schemeClr val="accent1"/>
+          </a:fillRef>
+          <a:effectRef idx="0">
+            <a:schemeClr val="accent1"/>
+          </a:effectRef>
+          <a:fontRef idx="minor">
+            <a:schemeClr val="lt1"/>
+          </a:fontRef>
+        </p:style>
+        <p:txBody>
+          <a:bodyPr rtlCol="0" anchor="ctr"/>
+          <a:lstStyle/>
+          <a:p>
+            <a:pPr algn="ctr"/>
+            <a:endParaRPr lang="es-AR"/>
+          </a:p>
+        </p:txBody>
+      </p:sp>
+      <p:sp>
+        <p:nvSpPr>
+          <p:cNvPr id="6" name="TextBox 5"/>
+          <p:cNvSpPr txBox="1"/>
+          <p:nvPr/>
+        </p:nvSpPr>
+        <p:spPr>
+          <a:xfrm>
+            <a:off x="4373526" y="2991293"/>
+            <a:ext cx="2445488" cy="369332"/>
+          </a:xfrm>
+          <a:prstGeom prst="rect">
+            <a:avLst/>
+          </a:prstGeom>
+          <a:noFill/>
+        </p:spPr>
+        <p:txBody>
+          <a:bodyPr wrap="square" rtlCol="0">
+            <a:spAutoFit/>
+          </a:bodyPr>
+          <a:lstStyle/>
+          <a:p>
+            <a:r>
+              <a:rPr lang="es-AR" dirty="0" smtClean="0"/>
+              <a:t>AUTHORIZE CODE:</a:t>
+            </a:r>
+            <a:endParaRPr lang="es-AR" dirty="0"/>
+          </a:p>
+        </p:txBody>
+      </p:sp>
+    </p:spTree>
+    <p:extLst>
+      <p:ext uri="{BB962C8B-B14F-4D97-AF65-F5344CB8AC3E}">
+        <p14:creationId xmlns:p14="http://schemas.microsoft.com/office/powerpoint/2010/main" val="3229194873"/>
+      </p:ext>
+    </p:extLst>
+  </p:cSld>
+  <p:clrMapOvr>
+    <a:masterClrMapping/>
+  </p:clrMapOvr>
+</p:sld>
+</file>
+
 <file path=ppt/slides/slide2.xml><?xml version="1.0" encoding="utf-8"?>
 <p:sld xmlns:a="http://schemas.openxmlformats.org/drawingml/2006/main" xmlns:r="http://schemas.openxmlformats.org/officeDocument/2006/relationships" xmlns:p="http://schemas.openxmlformats.org/presentationml/2006/main">
   <p:cSld>
@@ -3265,6 +4923,450 @@
     <p:extLst>
       <p:ext uri="{BB962C8B-B14F-4D97-AF65-F5344CB8AC3E}">
         <p14:creationId xmlns:p14="http://schemas.microsoft.com/office/powerpoint/2010/main" val="1187358763"/>
+      </p:ext>
+    </p:extLst>
+  </p:cSld>
+  <p:clrMapOvr>
+    <a:masterClrMapping/>
+  </p:clrMapOvr>
+</p:sld>
+</file>
+
+<file path=ppt/slides/slide20.xml><?xml version="1.0" encoding="utf-8"?>
+<p:sld xmlns:a="http://schemas.openxmlformats.org/drawingml/2006/main" xmlns:r="http://schemas.openxmlformats.org/officeDocument/2006/relationships" xmlns:p="http://schemas.openxmlformats.org/presentationml/2006/main">
+  <p:cSld>
+    <p:spTree>
+      <p:nvGrpSpPr>
+        <p:cNvPr id="1" name=""/>
+        <p:cNvGrpSpPr/>
+        <p:nvPr/>
+      </p:nvGrpSpPr>
+      <p:grpSpPr>
+        <a:xfrm>
+          <a:off x="0" y="0"/>
+          <a:ext cx="0" cy="0"/>
+          <a:chOff x="0" y="0"/>
+          <a:chExt cx="0" cy="0"/>
+        </a:xfrm>
+      </p:grpSpPr>
+      <p:pic>
+        <p:nvPicPr>
+          <p:cNvPr id="4" name="Picture 3"/>
+          <p:cNvPicPr>
+            <a:picLocks noChangeAspect="1"/>
+          </p:cNvPicPr>
+          <p:nvPr/>
+        </p:nvPicPr>
+        <p:blipFill>
+          <a:blip r:embed="rId2">
+            <a:extLst>
+              <a:ext uri="{28A0092B-C50C-407E-A947-70E740481C1C}">
+                <a14:useLocalDpi xmlns:a14="http://schemas.microsoft.com/office/drawing/2010/main" val="0"/>
+              </a:ext>
+            </a:extLst>
+          </a:blip>
+          <a:stretch>
+            <a:fillRect/>
+          </a:stretch>
+        </p:blipFill>
+        <p:spPr>
+          <a:xfrm>
+            <a:off x="2844059" y="990044"/>
+            <a:ext cx="6503882" cy="4877911"/>
+          </a:xfrm>
+          <a:prstGeom prst="rect">
+            <a:avLst/>
+          </a:prstGeom>
+        </p:spPr>
+      </p:pic>
+      <p:sp>
+        <p:nvSpPr>
+          <p:cNvPr id="5" name="Rectangle 4"/>
+          <p:cNvSpPr/>
+          <p:nvPr/>
+        </p:nvSpPr>
+        <p:spPr>
+          <a:xfrm>
+            <a:off x="4345172" y="2459665"/>
+            <a:ext cx="2190307" cy="389861"/>
+          </a:xfrm>
+          <a:prstGeom prst="rect">
+            <a:avLst/>
+          </a:prstGeom>
+          <a:solidFill>
+            <a:schemeClr val="bg1"/>
+          </a:solidFill>
+          <a:ln>
+            <a:noFill/>
+          </a:ln>
+        </p:spPr>
+        <p:style>
+          <a:lnRef idx="2">
+            <a:schemeClr val="accent1">
+              <a:shade val="50000"/>
+            </a:schemeClr>
+          </a:lnRef>
+          <a:fillRef idx="1">
+            <a:schemeClr val="accent1"/>
+          </a:fillRef>
+          <a:effectRef idx="0">
+            <a:schemeClr val="accent1"/>
+          </a:effectRef>
+          <a:fontRef idx="minor">
+            <a:schemeClr val="lt1"/>
+          </a:fontRef>
+        </p:style>
+        <p:txBody>
+          <a:bodyPr rtlCol="0" anchor="ctr"/>
+          <a:lstStyle/>
+          <a:p>
+            <a:pPr algn="ctr"/>
+            <a:endParaRPr lang="es-AR"/>
+          </a:p>
+        </p:txBody>
+      </p:sp>
+      <p:sp>
+        <p:nvSpPr>
+          <p:cNvPr id="6" name="TextBox 5"/>
+          <p:cNvSpPr txBox="1"/>
+          <p:nvPr/>
+        </p:nvSpPr>
+        <p:spPr>
+          <a:xfrm>
+            <a:off x="4345172" y="2459665"/>
+            <a:ext cx="2721935" cy="369332"/>
+          </a:xfrm>
+          <a:prstGeom prst="rect">
+            <a:avLst/>
+          </a:prstGeom>
+          <a:noFill/>
+        </p:spPr>
+        <p:txBody>
+          <a:bodyPr wrap="square" rtlCol="0">
+            <a:spAutoFit/>
+          </a:bodyPr>
+          <a:lstStyle/>
+          <a:p>
+            <a:r>
+              <a:rPr lang="es-AR" dirty="0" smtClean="0"/>
+              <a:t>PASSWORD CHANGED</a:t>
+            </a:r>
+            <a:endParaRPr lang="es-AR" dirty="0"/>
+          </a:p>
+        </p:txBody>
+      </p:sp>
+    </p:spTree>
+    <p:extLst>
+      <p:ext uri="{BB962C8B-B14F-4D97-AF65-F5344CB8AC3E}">
+        <p14:creationId xmlns:p14="http://schemas.microsoft.com/office/powerpoint/2010/main" val="3668107340"/>
+      </p:ext>
+    </p:extLst>
+  </p:cSld>
+  <p:clrMapOvr>
+    <a:masterClrMapping/>
+  </p:clrMapOvr>
+</p:sld>
+</file>
+
+<file path=ppt/slides/slide21.xml><?xml version="1.0" encoding="utf-8"?>
+<p:sld xmlns:a="http://schemas.openxmlformats.org/drawingml/2006/main" xmlns:r="http://schemas.openxmlformats.org/officeDocument/2006/relationships" xmlns:p="http://schemas.openxmlformats.org/presentationml/2006/main">
+  <p:cSld>
+    <p:spTree>
+      <p:nvGrpSpPr>
+        <p:cNvPr id="1" name=""/>
+        <p:cNvGrpSpPr/>
+        <p:nvPr/>
+      </p:nvGrpSpPr>
+      <p:grpSpPr>
+        <a:xfrm>
+          <a:off x="0" y="0"/>
+          <a:ext cx="0" cy="0"/>
+          <a:chOff x="0" y="0"/>
+          <a:chExt cx="0" cy="0"/>
+        </a:xfrm>
+      </p:grpSpPr>
+      <p:pic>
+        <p:nvPicPr>
+          <p:cNvPr id="4" name="Picture 3"/>
+          <p:cNvPicPr>
+            <a:picLocks noChangeAspect="1"/>
+          </p:cNvPicPr>
+          <p:nvPr/>
+        </p:nvPicPr>
+        <p:blipFill>
+          <a:blip r:embed="rId2">
+            <a:extLst>
+              <a:ext uri="{28A0092B-C50C-407E-A947-70E740481C1C}">
+                <a14:useLocalDpi xmlns:a14="http://schemas.microsoft.com/office/drawing/2010/main" val="0"/>
+              </a:ext>
+            </a:extLst>
+          </a:blip>
+          <a:stretch>
+            <a:fillRect/>
+          </a:stretch>
+        </p:blipFill>
+        <p:spPr>
+          <a:xfrm>
+            <a:off x="2666850" y="876630"/>
+            <a:ext cx="6503882" cy="4877911"/>
+          </a:xfrm>
+          <a:prstGeom prst="rect">
+            <a:avLst/>
+          </a:prstGeom>
+        </p:spPr>
+      </p:pic>
+      <p:sp>
+        <p:nvSpPr>
+          <p:cNvPr id="6" name="Rectangle 5"/>
+          <p:cNvSpPr/>
+          <p:nvPr/>
+        </p:nvSpPr>
+        <p:spPr>
+          <a:xfrm>
+            <a:off x="4182140" y="2296632"/>
+            <a:ext cx="2977116" cy="1219200"/>
+          </a:xfrm>
+          <a:prstGeom prst="rect">
+            <a:avLst/>
+          </a:prstGeom>
+          <a:solidFill>
+            <a:schemeClr val="bg1"/>
+          </a:solidFill>
+          <a:ln>
+            <a:noFill/>
+          </a:ln>
+        </p:spPr>
+        <p:style>
+          <a:lnRef idx="2">
+            <a:schemeClr val="accent1">
+              <a:shade val="50000"/>
+            </a:schemeClr>
+          </a:lnRef>
+          <a:fillRef idx="1">
+            <a:schemeClr val="accent1"/>
+          </a:fillRef>
+          <a:effectRef idx="0">
+            <a:schemeClr val="accent1"/>
+          </a:effectRef>
+          <a:fontRef idx="minor">
+            <a:schemeClr val="lt1"/>
+          </a:fontRef>
+        </p:style>
+        <p:txBody>
+          <a:bodyPr rtlCol="0" anchor="ctr"/>
+          <a:lstStyle/>
+          <a:p>
+            <a:pPr algn="ctr"/>
+            <a:endParaRPr lang="es-AR"/>
+          </a:p>
+        </p:txBody>
+      </p:sp>
+      <p:sp>
+        <p:nvSpPr>
+          <p:cNvPr id="7" name="TextBox 6"/>
+          <p:cNvSpPr txBox="1"/>
+          <p:nvPr/>
+        </p:nvSpPr>
+        <p:spPr>
+          <a:xfrm>
+            <a:off x="4182140" y="2346251"/>
+            <a:ext cx="2977116" cy="1631216"/>
+          </a:xfrm>
+          <a:prstGeom prst="rect">
+            <a:avLst/>
+          </a:prstGeom>
+          <a:noFill/>
+        </p:spPr>
+        <p:txBody>
+          <a:bodyPr wrap="square" rtlCol="0">
+            <a:spAutoFit/>
+          </a:bodyPr>
+          <a:lstStyle/>
+          <a:p>
+            <a:r>
+              <a:rPr lang="es-AR" sz="2000" dirty="0" smtClean="0"/>
+              <a:t>AUTH CODE:  [074000239]</a:t>
+            </a:r>
+          </a:p>
+          <a:p>
+            <a:r>
+              <a:rPr lang="es-AR" sz="2000" dirty="0" smtClean="0"/>
+              <a:t>AMOUNT: $ [20,00]</a:t>
+            </a:r>
+          </a:p>
+          <a:p>
+            <a:r>
+              <a:rPr lang="es-AR" sz="2000" dirty="0" smtClean="0"/>
+              <a:t>Authorized</a:t>
+            </a:r>
+          </a:p>
+          <a:p>
+            <a:endParaRPr lang="es-AR" sz="2000" dirty="0"/>
+          </a:p>
+          <a:p>
+            <a:r>
+              <a:rPr lang="es-AR" sz="2000" dirty="0" smtClean="0"/>
+              <a:t>PRINTING . . .</a:t>
+            </a:r>
+            <a:endParaRPr lang="es-AR" sz="2000" dirty="0"/>
+          </a:p>
+        </p:txBody>
+      </p:sp>
+    </p:spTree>
+    <p:extLst>
+      <p:ext uri="{BB962C8B-B14F-4D97-AF65-F5344CB8AC3E}">
+        <p14:creationId xmlns:p14="http://schemas.microsoft.com/office/powerpoint/2010/main" val="2573443927"/>
+      </p:ext>
+    </p:extLst>
+  </p:cSld>
+  <p:clrMapOvr>
+    <a:masterClrMapping/>
+  </p:clrMapOvr>
+</p:sld>
+</file>
+
+<file path=ppt/slides/slide22.xml><?xml version="1.0" encoding="utf-8"?>
+<p:sld xmlns:a="http://schemas.openxmlformats.org/drawingml/2006/main" xmlns:r="http://schemas.openxmlformats.org/officeDocument/2006/relationships" xmlns:p="http://schemas.openxmlformats.org/presentationml/2006/main">
+  <p:cSld>
+    <p:spTree>
+      <p:nvGrpSpPr>
+        <p:cNvPr id="1" name=""/>
+        <p:cNvGrpSpPr/>
+        <p:nvPr/>
+      </p:nvGrpSpPr>
+      <p:grpSpPr>
+        <a:xfrm>
+          <a:off x="0" y="0"/>
+          <a:ext cx="0" cy="0"/>
+          <a:chOff x="0" y="0"/>
+          <a:chExt cx="0" cy="0"/>
+        </a:xfrm>
+      </p:grpSpPr>
+      <p:pic>
+        <p:nvPicPr>
+          <p:cNvPr id="4" name="Picture 3"/>
+          <p:cNvPicPr>
+            <a:picLocks noChangeAspect="1"/>
+          </p:cNvPicPr>
+          <p:nvPr/>
+        </p:nvPicPr>
+        <p:blipFill>
+          <a:blip r:embed="rId2">
+            <a:extLst>
+              <a:ext uri="{28A0092B-C50C-407E-A947-70E740481C1C}">
+                <a14:useLocalDpi xmlns:a14="http://schemas.microsoft.com/office/drawing/2010/main" val="0"/>
+              </a:ext>
+            </a:extLst>
+          </a:blip>
+          <a:stretch>
+            <a:fillRect/>
+          </a:stretch>
+        </p:blipFill>
+        <p:spPr>
+          <a:xfrm>
+            <a:off x="2666850" y="876630"/>
+            <a:ext cx="6503882" cy="4877911"/>
+          </a:xfrm>
+          <a:prstGeom prst="rect">
+            <a:avLst/>
+          </a:prstGeom>
+        </p:spPr>
+      </p:pic>
+      <p:sp>
+        <p:nvSpPr>
+          <p:cNvPr id="6" name="Rectangle 5"/>
+          <p:cNvSpPr/>
+          <p:nvPr/>
+        </p:nvSpPr>
+        <p:spPr>
+          <a:xfrm>
+            <a:off x="4182140" y="2296632"/>
+            <a:ext cx="2977116" cy="1219200"/>
+          </a:xfrm>
+          <a:prstGeom prst="rect">
+            <a:avLst/>
+          </a:prstGeom>
+          <a:solidFill>
+            <a:schemeClr val="bg1"/>
+          </a:solidFill>
+          <a:ln>
+            <a:noFill/>
+          </a:ln>
+        </p:spPr>
+        <p:style>
+          <a:lnRef idx="2">
+            <a:schemeClr val="accent1">
+              <a:shade val="50000"/>
+            </a:schemeClr>
+          </a:lnRef>
+          <a:fillRef idx="1">
+            <a:schemeClr val="accent1"/>
+          </a:fillRef>
+          <a:effectRef idx="0">
+            <a:schemeClr val="accent1"/>
+          </a:effectRef>
+          <a:fontRef idx="minor">
+            <a:schemeClr val="lt1"/>
+          </a:fontRef>
+        </p:style>
+        <p:txBody>
+          <a:bodyPr rtlCol="0" anchor="ctr"/>
+          <a:lstStyle/>
+          <a:p>
+            <a:pPr algn="ctr"/>
+            <a:endParaRPr lang="es-AR"/>
+          </a:p>
+        </p:txBody>
+      </p:sp>
+      <p:sp>
+        <p:nvSpPr>
+          <p:cNvPr id="7" name="TextBox 6"/>
+          <p:cNvSpPr txBox="1"/>
+          <p:nvPr/>
+        </p:nvSpPr>
+        <p:spPr>
+          <a:xfrm>
+            <a:off x="4182140" y="2346251"/>
+            <a:ext cx="2977116" cy="1323439"/>
+          </a:xfrm>
+          <a:prstGeom prst="rect">
+            <a:avLst/>
+          </a:prstGeom>
+          <a:noFill/>
+        </p:spPr>
+        <p:txBody>
+          <a:bodyPr wrap="square" rtlCol="0">
+            <a:spAutoFit/>
+          </a:bodyPr>
+          <a:lstStyle/>
+          <a:p>
+            <a:r>
+              <a:rPr lang="es-AR" sz="2000" dirty="0" smtClean="0"/>
+              <a:t>AMOUNT: $ [20,00]</a:t>
+            </a:r>
+          </a:p>
+          <a:p>
+            <a:r>
+              <a:rPr lang="es-AR" sz="2000" dirty="0" smtClean="0"/>
+              <a:t>Authorized</a:t>
+            </a:r>
+          </a:p>
+          <a:p>
+            <a:endParaRPr lang="es-AR" sz="2000" dirty="0"/>
+          </a:p>
+          <a:p>
+            <a:r>
+              <a:rPr lang="es-AR" sz="2000" dirty="0" smtClean="0"/>
+              <a:t>PRINTING . . .</a:t>
+            </a:r>
+            <a:endParaRPr lang="es-AR" sz="2000" dirty="0"/>
+          </a:p>
+        </p:txBody>
+      </p:sp>
+    </p:spTree>
+    <p:extLst>
+      <p:ext uri="{BB962C8B-B14F-4D97-AF65-F5344CB8AC3E}">
+        <p14:creationId xmlns:p14="http://schemas.microsoft.com/office/powerpoint/2010/main" val="2034576042"/>
       </p:ext>
     </p:extLst>
   </p:cSld>
@@ -3939,6 +6041,494 @@
     <p:extLst>
       <p:ext uri="{BB962C8B-B14F-4D97-AF65-F5344CB8AC3E}">
         <p14:creationId xmlns:p14="http://schemas.microsoft.com/office/powerpoint/2010/main" val="1256715786"/>
+      </p:ext>
+    </p:extLst>
+  </p:cSld>
+  <p:clrMapOvr>
+    <a:masterClrMapping/>
+  </p:clrMapOvr>
+</p:sld>
+</file>
+
+<file path=ppt/slides/slide7.xml><?xml version="1.0" encoding="utf-8"?>
+<p:sld xmlns:a="http://schemas.openxmlformats.org/drawingml/2006/main" xmlns:r="http://schemas.openxmlformats.org/officeDocument/2006/relationships" xmlns:p="http://schemas.openxmlformats.org/presentationml/2006/main">
+  <p:cSld>
+    <p:spTree>
+      <p:nvGrpSpPr>
+        <p:cNvPr id="1" name=""/>
+        <p:cNvGrpSpPr/>
+        <p:nvPr/>
+      </p:nvGrpSpPr>
+      <p:grpSpPr>
+        <a:xfrm>
+          <a:off x="0" y="0"/>
+          <a:ext cx="0" cy="0"/>
+          <a:chOff x="0" y="0"/>
+          <a:chExt cx="0" cy="0"/>
+        </a:xfrm>
+      </p:grpSpPr>
+      <p:pic>
+        <p:nvPicPr>
+          <p:cNvPr id="4" name="Picture 3"/>
+          <p:cNvPicPr>
+            <a:picLocks noChangeAspect="1"/>
+          </p:cNvPicPr>
+          <p:nvPr/>
+        </p:nvPicPr>
+        <p:blipFill rotWithShape="1">
+          <a:blip r:embed="rId2">
+            <a:extLst>
+              <a:ext uri="{28A0092B-C50C-407E-A947-70E740481C1C}">
+                <a14:useLocalDpi xmlns:a14="http://schemas.microsoft.com/office/drawing/2010/main" val="0"/>
+              </a:ext>
+            </a:extLst>
+          </a:blip>
+          <a:srcRect l="17234" t="12511" r="16972" b="13239"/>
+          <a:stretch/>
+        </p:blipFill>
+        <p:spPr>
+          <a:xfrm>
+            <a:off x="3986213" y="1614488"/>
+            <a:ext cx="4279106" cy="3621881"/>
+          </a:xfrm>
+          <a:prstGeom prst="rect">
+            <a:avLst/>
+          </a:prstGeom>
+        </p:spPr>
+      </p:pic>
+      <p:sp>
+        <p:nvSpPr>
+          <p:cNvPr id="6" name="Rectangle 5"/>
+          <p:cNvSpPr/>
+          <p:nvPr/>
+        </p:nvSpPr>
+        <p:spPr>
+          <a:xfrm>
+            <a:off x="4477789" y="2632364"/>
+            <a:ext cx="2826327" cy="332509"/>
+          </a:xfrm>
+          <a:prstGeom prst="rect">
+            <a:avLst/>
+          </a:prstGeom>
+          <a:solidFill>
+            <a:schemeClr val="bg1"/>
+          </a:solidFill>
+          <a:ln>
+            <a:noFill/>
+          </a:ln>
+        </p:spPr>
+        <p:style>
+          <a:lnRef idx="2">
+            <a:schemeClr val="accent1">
+              <a:shade val="50000"/>
+            </a:schemeClr>
+          </a:lnRef>
+          <a:fillRef idx="1">
+            <a:schemeClr val="accent1"/>
+          </a:fillRef>
+          <a:effectRef idx="0">
+            <a:schemeClr val="accent1"/>
+          </a:effectRef>
+          <a:fontRef idx="minor">
+            <a:schemeClr val="lt1"/>
+          </a:fontRef>
+        </p:style>
+        <p:txBody>
+          <a:bodyPr rtlCol="0" anchor="ctr"/>
+          <a:lstStyle/>
+          <a:p>
+            <a:pPr algn="ctr"/>
+            <a:endParaRPr lang="es-AR"/>
+          </a:p>
+        </p:txBody>
+      </p:sp>
+      <p:sp>
+        <p:nvSpPr>
+          <p:cNvPr id="5" name="TextBox 4"/>
+          <p:cNvSpPr txBox="1"/>
+          <p:nvPr/>
+        </p:nvSpPr>
+        <p:spPr>
+          <a:xfrm>
+            <a:off x="4274288" y="2406831"/>
+            <a:ext cx="3154326" cy="2062103"/>
+          </a:xfrm>
+          <a:prstGeom prst="rect">
+            <a:avLst/>
+          </a:prstGeom>
+          <a:noFill/>
+        </p:spPr>
+        <p:txBody>
+          <a:bodyPr wrap="square" rtlCol="0">
+            <a:spAutoFit/>
+          </a:bodyPr>
+          <a:lstStyle/>
+          <a:p>
+            <a:r>
+              <a:rPr lang="es-AR" sz="1600" dirty="0" smtClean="0">
+                <a:latin typeface="Yu Gothic UI Semilight" panose="020B0400000000000000" pitchFamily="34" charset="-128"/>
+                <a:ea typeface="Yu Gothic UI Semilight" panose="020B0400000000000000" pitchFamily="34" charset="-128"/>
+              </a:rPr>
+              <a:t>1   PRE-AUTHORIZATION</a:t>
+            </a:r>
+          </a:p>
+          <a:p>
+            <a:r>
+              <a:rPr lang="es-AR" sz="1600" dirty="0" smtClean="0">
+                <a:latin typeface="Yu Gothic UI Semilight" panose="020B0400000000000000" pitchFamily="34" charset="-128"/>
+                <a:ea typeface="Yu Gothic UI Semilight" panose="020B0400000000000000" pitchFamily="34" charset="-128"/>
+              </a:rPr>
+              <a:t>2  COMPLETION</a:t>
+            </a:r>
+          </a:p>
+          <a:p>
+            <a:r>
+              <a:rPr lang="es-AR" sz="1600" dirty="0" smtClean="0">
+                <a:latin typeface="Yu Gothic UI Semilight" panose="020B0400000000000000" pitchFamily="34" charset="-128"/>
+                <a:ea typeface="Yu Gothic UI Semilight" panose="020B0400000000000000" pitchFamily="34" charset="-128"/>
+              </a:rPr>
+              <a:t>3  CLEAR PENDING PRE</a:t>
+            </a:r>
+          </a:p>
+          <a:p>
+            <a:r>
+              <a:rPr lang="es-AR" sz="1600" dirty="0" smtClean="0">
+                <a:latin typeface="Yu Gothic UI Semilight" panose="020B0400000000000000" pitchFamily="34" charset="-128"/>
+                <a:ea typeface="Yu Gothic UI Semilight" panose="020B0400000000000000" pitchFamily="34" charset="-128"/>
+              </a:rPr>
+              <a:t>4  SALE</a:t>
+            </a:r>
+          </a:p>
+          <a:p>
+            <a:r>
+              <a:rPr lang="es-AR" sz="1600" dirty="0" smtClean="0">
+                <a:latin typeface="Yu Gothic UI Semilight" panose="020B0400000000000000" pitchFamily="34" charset="-128"/>
+                <a:ea typeface="Yu Gothic UI Semilight" panose="020B0400000000000000" pitchFamily="34" charset="-128"/>
+              </a:rPr>
+              <a:t>5  BALANCE ENQUIRY</a:t>
+            </a:r>
+          </a:p>
+          <a:p>
+            <a:pPr marL="342900" indent="-342900">
+              <a:buAutoNum type="arabicPlain"/>
+            </a:pPr>
+            <a:endParaRPr lang="es-AR" sz="1600" dirty="0">
+              <a:latin typeface="Yu Gothic UI Semilight" panose="020B0400000000000000" pitchFamily="34" charset="-128"/>
+              <a:ea typeface="Yu Gothic UI Semilight" panose="020B0400000000000000" pitchFamily="34" charset="-128"/>
+            </a:endParaRPr>
+          </a:p>
+          <a:p>
+            <a:r>
+              <a:rPr lang="es-AR" sz="1600" dirty="0" smtClean="0">
+                <a:latin typeface="Yu Gothic UI Semilight" panose="020B0400000000000000" pitchFamily="34" charset="-128"/>
+                <a:ea typeface="Yu Gothic UI Semilight" panose="020B0400000000000000" pitchFamily="34" charset="-128"/>
+              </a:rPr>
+              <a:t>8  MAINTENANCE</a:t>
+            </a:r>
+            <a:endParaRPr lang="es-AR" sz="1600" dirty="0" smtClean="0">
+              <a:latin typeface="Yu Gothic UI Semilight" panose="020B0400000000000000" pitchFamily="34" charset="-128"/>
+              <a:ea typeface="Yu Gothic UI Semilight" panose="020B0400000000000000" pitchFamily="34" charset="-128"/>
+            </a:endParaRPr>
+          </a:p>
+          <a:p>
+            <a:pPr marL="342900" indent="-342900">
+              <a:buAutoNum type="arabicPlain"/>
+            </a:pPr>
+            <a:endParaRPr lang="es-AR" sz="1600" dirty="0">
+              <a:latin typeface="Yu Gothic UI Semilight" panose="020B0400000000000000" pitchFamily="34" charset="-128"/>
+              <a:ea typeface="Yu Gothic UI Semilight" panose="020B0400000000000000" pitchFamily="34" charset="-128"/>
+            </a:endParaRPr>
+          </a:p>
+        </p:txBody>
+      </p:sp>
+    </p:spTree>
+    <p:extLst>
+      <p:ext uri="{BB962C8B-B14F-4D97-AF65-F5344CB8AC3E}">
+        <p14:creationId xmlns:p14="http://schemas.microsoft.com/office/powerpoint/2010/main" val="1046930261"/>
+      </p:ext>
+    </p:extLst>
+  </p:cSld>
+  <p:clrMapOvr>
+    <a:masterClrMapping/>
+  </p:clrMapOvr>
+</p:sld>
+</file>
+
+<file path=ppt/slides/slide8.xml><?xml version="1.0" encoding="utf-8"?>
+<p:sld xmlns:a="http://schemas.openxmlformats.org/drawingml/2006/main" xmlns:r="http://schemas.openxmlformats.org/officeDocument/2006/relationships" xmlns:p="http://schemas.openxmlformats.org/presentationml/2006/main">
+  <p:cSld>
+    <p:spTree>
+      <p:nvGrpSpPr>
+        <p:cNvPr id="1" name=""/>
+        <p:cNvGrpSpPr/>
+        <p:nvPr/>
+      </p:nvGrpSpPr>
+      <p:grpSpPr>
+        <a:xfrm>
+          <a:off x="0" y="0"/>
+          <a:ext cx="0" cy="0"/>
+          <a:chOff x="0" y="0"/>
+          <a:chExt cx="0" cy="0"/>
+        </a:xfrm>
+      </p:grpSpPr>
+      <p:pic>
+        <p:nvPicPr>
+          <p:cNvPr id="4" name="Picture 3"/>
+          <p:cNvPicPr>
+            <a:picLocks noChangeAspect="1"/>
+          </p:cNvPicPr>
+          <p:nvPr/>
+        </p:nvPicPr>
+        <p:blipFill>
+          <a:blip r:embed="rId2">
+            <a:extLst>
+              <a:ext uri="{28A0092B-C50C-407E-A947-70E740481C1C}">
+                <a14:useLocalDpi xmlns:a14="http://schemas.microsoft.com/office/drawing/2010/main" val="0"/>
+              </a:ext>
+            </a:extLst>
+          </a:blip>
+          <a:stretch>
+            <a:fillRect/>
+          </a:stretch>
+        </p:blipFill>
+        <p:spPr>
+          <a:xfrm>
+            <a:off x="2844059" y="990044"/>
+            <a:ext cx="6503882" cy="4877911"/>
+          </a:xfrm>
+          <a:prstGeom prst="rect">
+            <a:avLst/>
+          </a:prstGeom>
+        </p:spPr>
+      </p:pic>
+      <p:sp>
+        <p:nvSpPr>
+          <p:cNvPr id="6" name="Rectangle 5"/>
+          <p:cNvSpPr/>
+          <p:nvPr/>
+        </p:nvSpPr>
+        <p:spPr>
+          <a:xfrm>
+            <a:off x="4501116" y="2594344"/>
+            <a:ext cx="2502196" cy="1268819"/>
+          </a:xfrm>
+          <a:prstGeom prst="rect">
+            <a:avLst/>
+          </a:prstGeom>
+          <a:solidFill>
+            <a:schemeClr val="bg1"/>
+          </a:solidFill>
+          <a:ln>
+            <a:noFill/>
+          </a:ln>
+        </p:spPr>
+        <p:style>
+          <a:lnRef idx="2">
+            <a:schemeClr val="accent1">
+              <a:shade val="50000"/>
+            </a:schemeClr>
+          </a:lnRef>
+          <a:fillRef idx="1">
+            <a:schemeClr val="accent1"/>
+          </a:fillRef>
+          <a:effectRef idx="0">
+            <a:schemeClr val="accent1"/>
+          </a:effectRef>
+          <a:fontRef idx="minor">
+            <a:schemeClr val="lt1"/>
+          </a:fontRef>
+        </p:style>
+        <p:txBody>
+          <a:bodyPr rtlCol="0" anchor="ctr"/>
+          <a:lstStyle/>
+          <a:p>
+            <a:pPr algn="ctr"/>
+            <a:endParaRPr lang="es-AR"/>
+          </a:p>
+        </p:txBody>
+      </p:sp>
+      <p:sp>
+        <p:nvSpPr>
+          <p:cNvPr id="5" name="TextBox 4"/>
+          <p:cNvSpPr txBox="1"/>
+          <p:nvPr/>
+        </p:nvSpPr>
+        <p:spPr>
+          <a:xfrm>
+            <a:off x="4501116" y="2720921"/>
+            <a:ext cx="2587256" cy="1015663"/>
+          </a:xfrm>
+          <a:prstGeom prst="rect">
+            <a:avLst/>
+          </a:prstGeom>
+          <a:noFill/>
+        </p:spPr>
+        <p:txBody>
+          <a:bodyPr wrap="square" rtlCol="0">
+            <a:spAutoFit/>
+          </a:bodyPr>
+          <a:lstStyle/>
+          <a:p>
+            <a:pPr algn="ctr"/>
+            <a:r>
+              <a:rPr lang="es-AR" sz="2000" dirty="0" smtClean="0"/>
+              <a:t>PRESENT</a:t>
+            </a:r>
+          </a:p>
+          <a:p>
+            <a:pPr algn="ctr"/>
+            <a:endParaRPr lang="es-AR" sz="2000" dirty="0"/>
+          </a:p>
+          <a:p>
+            <a:pPr algn="ctr"/>
+            <a:r>
+              <a:rPr lang="es-AR" sz="2000" dirty="0" smtClean="0"/>
+              <a:t>IDENTIFICATION</a:t>
+            </a:r>
+            <a:endParaRPr lang="es-AR" sz="2000" dirty="0"/>
+          </a:p>
+        </p:txBody>
+      </p:sp>
+    </p:spTree>
+    <p:extLst>
+      <p:ext uri="{BB962C8B-B14F-4D97-AF65-F5344CB8AC3E}">
+        <p14:creationId xmlns:p14="http://schemas.microsoft.com/office/powerpoint/2010/main" val="914091780"/>
+      </p:ext>
+    </p:extLst>
+  </p:cSld>
+  <p:clrMapOvr>
+    <a:masterClrMapping/>
+  </p:clrMapOvr>
+</p:sld>
+</file>
+
+<file path=ppt/slides/slide9.xml><?xml version="1.0" encoding="utf-8"?>
+<p:sld xmlns:a="http://schemas.openxmlformats.org/drawingml/2006/main" xmlns:r="http://schemas.openxmlformats.org/officeDocument/2006/relationships" xmlns:p="http://schemas.openxmlformats.org/presentationml/2006/main">
+  <p:cSld>
+    <p:spTree>
+      <p:nvGrpSpPr>
+        <p:cNvPr id="1" name=""/>
+        <p:cNvGrpSpPr/>
+        <p:nvPr/>
+      </p:nvGrpSpPr>
+      <p:grpSpPr>
+        <a:xfrm>
+          <a:off x="0" y="0"/>
+          <a:ext cx="0" cy="0"/>
+          <a:chOff x="0" y="0"/>
+          <a:chExt cx="0" cy="0"/>
+        </a:xfrm>
+      </p:grpSpPr>
+      <p:pic>
+        <p:nvPicPr>
+          <p:cNvPr id="4" name="Picture 3"/>
+          <p:cNvPicPr>
+            <a:picLocks noChangeAspect="1"/>
+          </p:cNvPicPr>
+          <p:nvPr/>
+        </p:nvPicPr>
+        <p:blipFill>
+          <a:blip r:embed="rId2">
+            <a:extLst>
+              <a:ext uri="{28A0092B-C50C-407E-A947-70E740481C1C}">
+                <a14:useLocalDpi xmlns:a14="http://schemas.microsoft.com/office/drawing/2010/main" val="0"/>
+              </a:ext>
+            </a:extLst>
+          </a:blip>
+          <a:stretch>
+            <a:fillRect/>
+          </a:stretch>
+        </p:blipFill>
+        <p:spPr>
+          <a:xfrm>
+            <a:off x="2844059" y="990044"/>
+            <a:ext cx="6503882" cy="4877911"/>
+          </a:xfrm>
+          <a:prstGeom prst="rect">
+            <a:avLst/>
+          </a:prstGeom>
+        </p:spPr>
+      </p:pic>
+      <p:sp>
+        <p:nvSpPr>
+          <p:cNvPr id="5" name="Rectangle 4"/>
+          <p:cNvSpPr/>
+          <p:nvPr/>
+        </p:nvSpPr>
+        <p:spPr>
+          <a:xfrm>
+            <a:off x="4486940" y="3019647"/>
+            <a:ext cx="2509283" cy="489097"/>
+          </a:xfrm>
+          <a:prstGeom prst="rect">
+            <a:avLst/>
+          </a:prstGeom>
+          <a:solidFill>
+            <a:schemeClr val="bg1"/>
+          </a:solidFill>
+          <a:ln>
+            <a:noFill/>
+          </a:ln>
+        </p:spPr>
+        <p:style>
+          <a:lnRef idx="2">
+            <a:schemeClr val="accent1">
+              <a:shade val="50000"/>
+            </a:schemeClr>
+          </a:lnRef>
+          <a:fillRef idx="1">
+            <a:schemeClr val="accent1"/>
+          </a:fillRef>
+          <a:effectRef idx="0">
+            <a:schemeClr val="accent1"/>
+          </a:effectRef>
+          <a:fontRef idx="minor">
+            <a:schemeClr val="lt1"/>
+          </a:fontRef>
+        </p:style>
+        <p:txBody>
+          <a:bodyPr rtlCol="0" anchor="ctr"/>
+          <a:lstStyle/>
+          <a:p>
+            <a:pPr algn="ctr"/>
+            <a:endParaRPr lang="es-AR"/>
+          </a:p>
+        </p:txBody>
+      </p:sp>
+      <p:sp>
+        <p:nvSpPr>
+          <p:cNvPr id="7" name="TextBox 6"/>
+          <p:cNvSpPr txBox="1"/>
+          <p:nvPr/>
+        </p:nvSpPr>
+        <p:spPr>
+          <a:xfrm>
+            <a:off x="4621619" y="3019647"/>
+            <a:ext cx="2516372" cy="369332"/>
+          </a:xfrm>
+          <a:prstGeom prst="rect">
+            <a:avLst/>
+          </a:prstGeom>
+          <a:noFill/>
+        </p:spPr>
+        <p:txBody>
+          <a:bodyPr wrap="square" rtlCol="0">
+            <a:spAutoFit/>
+          </a:bodyPr>
+          <a:lstStyle/>
+          <a:p>
+            <a:r>
+              <a:rPr lang="es-AR" dirty="0" smtClean="0"/>
+              <a:t>PROCESSING . . .</a:t>
+            </a:r>
+            <a:endParaRPr lang="es-AR" dirty="0"/>
+          </a:p>
+        </p:txBody>
+      </p:sp>
+    </p:spTree>
+    <p:extLst>
+      <p:ext uri="{BB962C8B-B14F-4D97-AF65-F5344CB8AC3E}">
+        <p14:creationId xmlns:p14="http://schemas.microsoft.com/office/powerpoint/2010/main" val="2819244149"/>
       </p:ext>
     </p:extLst>
   </p:cSld>

</xml_diff>